<commit_message>
header images and style changes
</commit_message>
<xml_diff>
--- a/static/assets/img/landing/images_landing.pptx
+++ b/static/assets/img/landing/images_landing.pptx
@@ -10,6 +10,7 @@
     <p:sldId id="259" r:id="rId4"/>
     <p:sldId id="258" r:id="rId5"/>
     <p:sldId id="260" r:id="rId6"/>
+    <p:sldId id="261" r:id="rId7"/>
   </p:sldIdLst>
   <p:sldSz cx="12192000" cy="6858000"/>
   <p:notesSz cx="6858000" cy="9144000"/>
@@ -108,7 +109,16 @@
       </a:defRPr>
     </a:lvl9pPr>
   </p:defaultTextStyle>
+  <p:extLst>
+    <p:ext uri="{EFAFB233-063F-42B5-8137-9DF3F51BA10A}">
+      <p15:sldGuideLst xmlns:p15="http://schemas.microsoft.com/office/powerpoint/2012/main"/>
+    </p:ext>
+  </p:extLst>
 </p:presentation>
+</file>
+
+<file path=ppt/revisionInfo.xml><?xml version="1.0" encoding="utf-8"?>
+<p1510:revInfo xmlns:a="http://schemas.openxmlformats.org/drawingml/2006/main" xmlns:r="http://schemas.openxmlformats.org/officeDocument/2006/relationships" xmlns:p1510="http://schemas.microsoft.com/office/powerpoint/2015/10/main"/>
 </file>
 
 <file path=ppt/slideLayouts/slideLayout1.xml><?xml version="1.0" encoding="utf-8"?>
@@ -3405,8 +3415,8 @@
         </p:nvGrpSpPr>
         <p:grpSpPr>
           <a:xfrm>
-            <a:off x="0" y="1856506"/>
-            <a:ext cx="12192000" cy="3209544"/>
+            <a:off x="2410691" y="1510146"/>
+            <a:ext cx="8188036" cy="3458922"/>
             <a:chOff x="0" y="1856506"/>
             <a:chExt cx="12192000" cy="3209544"/>
           </a:xfrm>
@@ -3486,7 +3496,7 @@
           <p:spPr>
             <a:xfrm>
               <a:off x="163312" y="1966916"/>
-              <a:ext cx="2135298" cy="1808914"/>
+              <a:ext cx="2758407" cy="1808914"/>
             </a:xfrm>
             <a:prstGeom prst="rect">
               <a:avLst/>
@@ -3527,8 +3537,8 @@
           </p:blipFill>
           <p:spPr>
             <a:xfrm>
-              <a:off x="2394774" y="2772743"/>
-              <a:ext cx="2079087" cy="2050476"/>
+              <a:off x="2921719" y="3438186"/>
+              <a:ext cx="1637758" cy="1615219"/>
             </a:xfrm>
             <a:prstGeom prst="rect">
               <a:avLst/>
@@ -3563,7 +3573,7 @@
           </p:blipFill>
           <p:spPr>
             <a:xfrm>
-              <a:off x="7252558" y="3219107"/>
+              <a:off x="7212969" y="3239004"/>
               <a:ext cx="2346335" cy="1723838"/>
             </a:xfrm>
             <a:prstGeom prst="rect">
@@ -3586,7 +3596,7 @@
           <p:spPr>
             <a:xfrm>
               <a:off x="87748" y="3832726"/>
-              <a:ext cx="2210862" cy="369332"/>
+              <a:ext cx="2194014" cy="599732"/>
             </a:xfrm>
             <a:prstGeom prst="rect">
               <a:avLst/>
@@ -3599,12 +3609,23 @@
             </a:bodyPr>
             <a:lstStyle/>
             <a:p>
+              <a:pPr algn="ctr"/>
               <a:r>
                 <a:rPr lang="en-US" dirty="0">
                   <a:latin typeface="Aharoni" panose="02010803020104030203" pitchFamily="2" charset="-79"/>
                   <a:cs typeface="Aharoni" panose="02010803020104030203" pitchFamily="2" charset="-79"/>
                 </a:rPr>
-                <a:t>Mechanical Design</a:t>
+                <a:t>Mechanical </a:t>
+              </a:r>
+            </a:p>
+            <a:p>
+              <a:pPr algn="ctr"/>
+              <a:r>
+                <a:rPr lang="en-US" dirty="0">
+                  <a:latin typeface="Aharoni" panose="02010803020104030203" pitchFamily="2" charset="-79"/>
+                  <a:cs typeface="Aharoni" panose="02010803020104030203" pitchFamily="2" charset="-79"/>
+                </a:rPr>
+                <a:t>Design</a:t>
               </a:r>
             </a:p>
           </p:txBody>
@@ -3623,8 +3644,8 @@
           </p:nvSpPr>
           <p:spPr>
             <a:xfrm>
-              <a:off x="3093617" y="2403411"/>
-              <a:ext cx="644728" cy="369332"/>
+              <a:off x="3314624" y="3130706"/>
+              <a:ext cx="644727" cy="369332"/>
             </a:xfrm>
             <a:prstGeom prst="rect">
               <a:avLst/>
@@ -3661,7 +3682,7 @@
           </p:nvSpPr>
           <p:spPr>
             <a:xfrm>
-              <a:off x="4859096" y="3711694"/>
+              <a:off x="4328981" y="3296736"/>
               <a:ext cx="1661032" cy="369332"/>
             </a:xfrm>
             <a:prstGeom prst="rect">
@@ -3699,8 +3720,8 @@
           </p:nvSpPr>
           <p:spPr>
             <a:xfrm>
-              <a:off x="9951117" y="4453887"/>
-              <a:ext cx="1888659" cy="369332"/>
+              <a:off x="9953339" y="3926271"/>
+              <a:ext cx="1678450" cy="599732"/>
             </a:xfrm>
             <a:prstGeom prst="rect">
               <a:avLst/>
@@ -3713,12 +3734,23 @@
             </a:bodyPr>
             <a:lstStyle/>
             <a:p>
+              <a:pPr algn="ctr"/>
               <a:r>
                 <a:rPr lang="en-US" dirty="0">
                   <a:latin typeface="Aharoni" panose="02010803020104030203" pitchFamily="2" charset="-79"/>
                   <a:cs typeface="Aharoni" panose="02010803020104030203" pitchFamily="2" charset="-79"/>
                 </a:rPr>
-                <a:t>Thermal Testing</a:t>
+                <a:t>Thermal </a:t>
+              </a:r>
+            </a:p>
+            <a:p>
+              <a:pPr algn="ctr"/>
+              <a:r>
+                <a:rPr lang="en-US" dirty="0">
+                  <a:latin typeface="Aharoni" panose="02010803020104030203" pitchFamily="2" charset="-79"/>
+                  <a:cs typeface="Aharoni" panose="02010803020104030203" pitchFamily="2" charset="-79"/>
+                </a:rPr>
+                <a:t>Testing</a:t>
               </a:r>
             </a:p>
           </p:txBody>
@@ -3737,7 +3769,7 @@
             </p:cNvPicPr>
             <p:nvPr/>
           </p:nvPicPr>
-          <p:blipFill>
+          <p:blipFill rotWithShape="1">
             <a:blip r:embed="rId6">
               <a:extLst>
                 <a:ext uri="{28A0092B-C50C-407E-A947-70E740481C1C}">
@@ -3745,14 +3777,13 @@
                 </a:ext>
               </a:extLst>
             </a:blip>
-            <a:stretch>
-              <a:fillRect/>
-            </a:stretch>
+            <a:srcRect b="19469"/>
+            <a:stretch/>
           </p:blipFill>
           <p:spPr>
             <a:xfrm>
-              <a:off x="9578108" y="2060992"/>
-              <a:ext cx="2447718" cy="2316229"/>
+              <a:off x="9578108" y="2060993"/>
+              <a:ext cx="2447718" cy="1865278"/>
             </a:xfrm>
             <a:prstGeom prst="rect">
               <a:avLst/>
@@ -3773,7 +3804,7 @@
             </p:cNvPicPr>
             <p:nvPr/>
           </p:nvPicPr>
-          <p:blipFill>
+          <p:blipFill rotWithShape="1">
             <a:blip r:embed="rId7">
               <a:extLst>
                 <a:ext uri="{28A0092B-C50C-407E-A947-70E740481C1C}">
@@ -3781,14 +3812,13 @@
                 </a:ext>
               </a:extLst>
             </a:blip>
-            <a:stretch>
-              <a:fillRect/>
-            </a:stretch>
+            <a:srcRect b="26780"/>
+            <a:stretch/>
           </p:blipFill>
           <p:spPr>
             <a:xfrm>
-              <a:off x="4506412" y="1966916"/>
-              <a:ext cx="2499375" cy="1736468"/>
+              <a:off x="4302971" y="2060993"/>
+              <a:ext cx="2499374" cy="1271447"/>
             </a:xfrm>
             <a:prstGeom prst="rect">
               <a:avLst/>
@@ -3809,8 +3839,8 @@
           </p:nvSpPr>
           <p:spPr>
             <a:xfrm>
-              <a:off x="7995231" y="2708858"/>
-              <a:ext cx="593432" cy="369332"/>
+              <a:off x="7626529" y="2849773"/>
+              <a:ext cx="593433" cy="369332"/>
             </a:xfrm>
             <a:prstGeom prst="rect">
               <a:avLst/>
@@ -3878,8 +3908,8 @@
         </p:nvGrpSpPr>
         <p:grpSpPr>
           <a:xfrm>
-            <a:off x="0" y="1856506"/>
-            <a:ext cx="12192000" cy="3209544"/>
+            <a:off x="2046515" y="1567543"/>
+            <a:ext cx="8193024" cy="3456432"/>
             <a:chOff x="0" y="1856506"/>
             <a:chExt cx="12192000" cy="3209544"/>
           </a:xfrm>
@@ -4425,6 +4455,36 @@
 </p:sld>
 </file>
 
+<file path=ppt/slides/slide6.xml><?xml version="1.0" encoding="utf-8"?>
+<p:sld xmlns:a="http://schemas.openxmlformats.org/drawingml/2006/main" xmlns:r="http://schemas.openxmlformats.org/officeDocument/2006/relationships" xmlns:p="http://schemas.openxmlformats.org/presentationml/2006/main">
+  <p:cSld>
+    <p:spTree>
+      <p:nvGrpSpPr>
+        <p:cNvPr id="1" name=""/>
+        <p:cNvGrpSpPr/>
+        <p:nvPr/>
+      </p:nvGrpSpPr>
+      <p:grpSpPr>
+        <a:xfrm>
+          <a:off x="0" y="0"/>
+          <a:ext cx="0" cy="0"/>
+          <a:chOff x="0" y="0"/>
+          <a:chExt cx="0" cy="0"/>
+        </a:xfrm>
+      </p:grpSpPr>
+    </p:spTree>
+    <p:extLst>
+      <p:ext uri="{BB962C8B-B14F-4D97-AF65-F5344CB8AC3E}">
+        <p14:creationId xmlns:p14="http://schemas.microsoft.com/office/powerpoint/2010/main" val="2446655996"/>
+      </p:ext>
+    </p:extLst>
+  </p:cSld>
+  <p:clrMapOvr>
+    <a:masterClrMapping/>
+  </p:clrMapOvr>
+</p:sld>
+</file>
+
 <file path=ppt/theme/theme1.xml><?xml version="1.0" encoding="utf-8"?>
 <a:theme xmlns:a="http://schemas.openxmlformats.org/drawingml/2006/main" name="Office Theme">
   <a:themeElements>

</xml_diff>